<commit_message>
Deploy hytechclub/py-201 to github.com/hytechclub/py-201.git:gh-pages
</commit_message>
<xml_diff>
--- a/BasicProgramming/BasicProgramming.pptx
+++ b/BasicProgramming/BasicProgramming.pptx
@@ -221,7 +221,7 @@
           <a:p>
             <a:fld id="{19104133-B5B0-4351-8158-4F0E5EB1E2BF}" type="datetimeFigureOut">
               <a:rPr lang="en-US" smtClean="0"/>
-              <a:t>1/7/2021</a:t>
+              <a:t>1/28/2021</a:t>
             </a:fld>
             <a:endParaRPr lang="en-US"/>
           </a:p>
@@ -1784,7 +1784,7 @@
             <a:fld id="{1C2D31DE-C454-491C-B5C3-F097855E3DF7}" type="datetime4">
               <a:rPr lang="en-US" smtClean="0"/>
               <a:pPr/>
-              <a:t>January 7, 2021</a:t>
+              <a:t>January 28, 2021</a:t>
             </a:fld>
             <a:endParaRPr lang="en-US" dirty="0"/>
           </a:p>
@@ -5176,7 +5176,7 @@
           <a:p>
             <a:fld id="{5958763E-B898-436D-883D-03711491D54A}" type="datetimeFigureOut">
               <a:rPr lang="en-US" smtClean="0"/>
-              <a:t>1/7/2021</a:t>
+              <a:t>1/28/2021</a:t>
             </a:fld>
             <a:endParaRPr lang="en-US"/>
           </a:p>
@@ -5369,7 +5369,7 @@
           <a:p>
             <a:fld id="{5958763E-B898-436D-883D-03711491D54A}" type="datetimeFigureOut">
               <a:rPr lang="en-US" smtClean="0"/>
-              <a:t>1/7/2021</a:t>
+              <a:t>1/28/2021</a:t>
             </a:fld>
             <a:endParaRPr lang="en-US"/>
           </a:p>
@@ -5619,7 +5619,7 @@
           <a:p>
             <a:fld id="{5958763E-B898-436D-883D-03711491D54A}" type="datetimeFigureOut">
               <a:rPr lang="en-US" smtClean="0"/>
-              <a:t>1/7/2021</a:t>
+              <a:t>1/28/2021</a:t>
             </a:fld>
             <a:endParaRPr lang="en-US"/>
           </a:p>
@@ -5967,7 +5967,7 @@
           <a:p>
             <a:fld id="{5958763E-B898-436D-883D-03711491D54A}" type="datetimeFigureOut">
               <a:rPr lang="en-US" smtClean="0"/>
-              <a:t>1/7/2021</a:t>
+              <a:t>1/28/2021</a:t>
             </a:fld>
             <a:endParaRPr lang="en-US"/>
           </a:p>
@@ -6383,7 +6383,7 @@
           <a:p>
             <a:fld id="{5958763E-B898-436D-883D-03711491D54A}" type="datetimeFigureOut">
               <a:rPr lang="en-US" smtClean="0"/>
-              <a:t>1/7/2021</a:t>
+              <a:t>1/28/2021</a:t>
             </a:fld>
             <a:endParaRPr lang="en-US"/>
           </a:p>
@@ -6884,7 +6884,7 @@
           <a:p>
             <a:fld id="{5958763E-B898-436D-883D-03711491D54A}" type="datetimeFigureOut">
               <a:rPr lang="en-US" smtClean="0"/>
-              <a:t>1/7/2021</a:t>
+              <a:t>1/28/2021</a:t>
             </a:fld>
             <a:endParaRPr lang="en-US"/>
           </a:p>
@@ -7335,7 +7335,7 @@
           <a:p>
             <a:fld id="{5958763E-B898-436D-883D-03711491D54A}" type="datetimeFigureOut">
               <a:rPr lang="en-US" smtClean="0"/>
-              <a:t>1/7/2021</a:t>
+              <a:t>1/28/2021</a:t>
             </a:fld>
             <a:endParaRPr lang="en-US"/>
           </a:p>
@@ -7946,7 +7946,7 @@
           <a:p>
             <a:fld id="{5958763E-B898-436D-883D-03711491D54A}" type="datetimeFigureOut">
               <a:rPr lang="en-US" smtClean="0"/>
-              <a:t>1/7/2021</a:t>
+              <a:t>1/28/2021</a:t>
             </a:fld>
             <a:endParaRPr lang="en-US"/>
           </a:p>
@@ -8717,7 +8717,7 @@
           <a:p>
             <a:fld id="{5958763E-B898-436D-883D-03711491D54A}" type="datetimeFigureOut">
               <a:rPr lang="en-US" smtClean="0"/>
-              <a:t>1/7/2021</a:t>
+              <a:t>1/28/2021</a:t>
             </a:fld>
             <a:endParaRPr lang="en-US"/>
           </a:p>
@@ -8821,7 +8821,7 @@
           <a:p>
             <a:fld id="{5958763E-B898-436D-883D-03711491D54A}" type="datetimeFigureOut">
               <a:rPr lang="en-US" smtClean="0"/>
-              <a:t>1/7/2021</a:t>
+              <a:t>1/28/2021</a:t>
             </a:fld>
             <a:endParaRPr lang="en-US"/>
           </a:p>
@@ -9148,7 +9148,7 @@
             <a:fld id="{1C2D31DE-C454-491C-B5C3-F097855E3DF7}" type="datetime4">
               <a:rPr lang="en-US" smtClean="0"/>
               <a:pPr/>
-              <a:t>January 7, 2021</a:t>
+              <a:t>January 28, 2021</a:t>
             </a:fld>
             <a:endParaRPr lang="en-US" dirty="0"/>
           </a:p>
@@ -12300,7 +12300,7 @@
           <a:p>
             <a:fld id="{5958763E-B898-436D-883D-03711491D54A}" type="datetimeFigureOut">
               <a:rPr lang="en-US" smtClean="0"/>
-              <a:t>1/7/2021</a:t>
+              <a:t>1/28/2021</a:t>
             </a:fld>
             <a:endParaRPr lang="en-US"/>
           </a:p>
@@ -12424,7 +12424,7 @@
           <a:p>
             <a:fld id="{5958763E-B898-436D-883D-03711491D54A}" type="datetimeFigureOut">
               <a:rPr lang="en-US" smtClean="0"/>
-              <a:t>1/7/2021</a:t>
+              <a:t>1/28/2021</a:t>
             </a:fld>
             <a:endParaRPr lang="en-US"/>
           </a:p>
@@ -12548,7 +12548,7 @@
           <a:p>
             <a:fld id="{5958763E-B898-436D-883D-03711491D54A}" type="datetimeFigureOut">
               <a:rPr lang="en-US" smtClean="0"/>
-              <a:t>1/7/2021</a:t>
+              <a:t>1/28/2021</a:t>
             </a:fld>
             <a:endParaRPr lang="en-US"/>
           </a:p>
@@ -12672,7 +12672,7 @@
           <a:p>
             <a:fld id="{5958763E-B898-436D-883D-03711491D54A}" type="datetimeFigureOut">
               <a:rPr lang="en-US" smtClean="0"/>
-              <a:t>1/7/2021</a:t>
+              <a:t>1/28/2021</a:t>
             </a:fld>
             <a:endParaRPr lang="en-US"/>
           </a:p>
@@ -12796,7 +12796,7 @@
           <a:p>
             <a:fld id="{5958763E-B898-436D-883D-03711491D54A}" type="datetimeFigureOut">
               <a:rPr lang="en-US" smtClean="0"/>
-              <a:t>1/7/2021</a:t>
+              <a:t>1/28/2021</a:t>
             </a:fld>
             <a:endParaRPr lang="en-US"/>
           </a:p>
@@ -12920,7 +12920,7 @@
           <a:p>
             <a:fld id="{5958763E-B898-436D-883D-03711491D54A}" type="datetimeFigureOut">
               <a:rPr lang="en-US" smtClean="0"/>
-              <a:t>1/7/2021</a:t>
+              <a:t>1/28/2021</a:t>
             </a:fld>
             <a:endParaRPr lang="en-US"/>
           </a:p>
@@ -13044,7 +13044,7 @@
           <a:p>
             <a:fld id="{5958763E-B898-436D-883D-03711491D54A}" type="datetimeFigureOut">
               <a:rPr lang="en-US" smtClean="0"/>
-              <a:t>1/7/2021</a:t>
+              <a:t>1/28/2021</a:t>
             </a:fld>
             <a:endParaRPr lang="en-US"/>
           </a:p>
@@ -13168,7 +13168,7 @@
           <a:p>
             <a:fld id="{5958763E-B898-436D-883D-03711491D54A}" type="datetimeFigureOut">
               <a:rPr lang="en-US" smtClean="0"/>
-              <a:t>1/7/2021</a:t>
+              <a:t>1/28/2021</a:t>
             </a:fld>
             <a:endParaRPr lang="en-US"/>
           </a:p>
@@ -13301,7 +13301,7 @@
           <a:p>
             <a:fld id="{5958763E-B898-436D-883D-03711491D54A}" type="datetimeFigureOut">
               <a:rPr lang="en-US" smtClean="0"/>
-              <a:t>1/7/2021</a:t>
+              <a:t>1/28/2021</a:t>
             </a:fld>
             <a:endParaRPr lang="en-US"/>
           </a:p>
@@ -16640,7 +16640,7 @@
             <a:fld id="{1C2D31DE-C454-491C-B5C3-F097855E3DF7}" type="datetime4">
               <a:rPr lang="en-US" smtClean="0"/>
               <a:pPr/>
-              <a:t>January 7, 2021</a:t>
+              <a:t>January 28, 2021</a:t>
             </a:fld>
             <a:endParaRPr lang="en-US" dirty="0"/>
           </a:p>
@@ -28876,7 +28876,7 @@
           <a:p>
             <a:fld id="{5958763E-B898-436D-883D-03711491D54A}" type="datetimeFigureOut">
               <a:rPr lang="en-US" smtClean="0"/>
-              <a:t>1/7/2021</a:t>
+              <a:t>1/28/2021</a:t>
             </a:fld>
             <a:endParaRPr lang="en-US"/>
           </a:p>
@@ -29278,7 +29278,7 @@
           <a:p>
             <a:fld id="{5958763E-B898-436D-883D-03711491D54A}" type="datetimeFigureOut">
               <a:rPr lang="en-US" smtClean="0"/>
-              <a:t>1/7/2021</a:t>
+              <a:t>1/28/2021</a:t>
             </a:fld>
             <a:endParaRPr lang="en-US"/>
           </a:p>
@@ -29572,7 +29572,7 @@
           <a:p>
             <a:fld id="{5958763E-B898-436D-883D-03711491D54A}" type="datetimeFigureOut">
               <a:rPr lang="en-US" smtClean="0"/>
-              <a:t>1/7/2021</a:t>
+              <a:t>1/28/2021</a:t>
             </a:fld>
             <a:endParaRPr lang="en-US"/>
           </a:p>
@@ -29773,7 +29773,7 @@
           <a:p>
             <a:fld id="{5958763E-B898-436D-883D-03711491D54A}" type="datetimeFigureOut">
               <a:rPr lang="en-US" smtClean="0"/>
-              <a:t>1/7/2021</a:t>
+              <a:t>1/28/2021</a:t>
             </a:fld>
             <a:endParaRPr lang="en-US"/>
           </a:p>
@@ -30034,7 +30034,7 @@
           <a:p>
             <a:fld id="{5958763E-B898-436D-883D-03711491D54A}" type="datetimeFigureOut">
               <a:rPr lang="en-US" smtClean="0"/>
-              <a:t>1/7/2021</a:t>
+              <a:t>1/28/2021</a:t>
             </a:fld>
             <a:endParaRPr lang="en-US"/>
           </a:p>
@@ -30542,7 +30542,7 @@
           <a:p>
             <a:fld id="{5958763E-B898-436D-883D-03711491D54A}" type="datetimeFigureOut">
               <a:rPr lang="en-US" smtClean="0"/>
-              <a:t>1/7/2021</a:t>
+              <a:t>1/28/2021</a:t>
             </a:fld>
             <a:endParaRPr lang="en-US"/>
           </a:p>
@@ -31021,7 +31021,7 @@
           <a:p>
             <a:fld id="{5958763E-B898-436D-883D-03711491D54A}" type="datetimeFigureOut">
               <a:rPr lang="en-US" smtClean="0"/>
-              <a:t>1/7/2021</a:t>
+              <a:t>1/28/2021</a:t>
             </a:fld>
             <a:endParaRPr lang="en-US"/>
           </a:p>
@@ -31840,7 +31840,7 @@
           <a:p>
             <a:fld id="{5958763E-B898-436D-883D-03711491D54A}" type="datetimeFigureOut">
               <a:rPr lang="en-US" smtClean="0"/>
-              <a:t>1/7/2021</a:t>
+              <a:t>1/28/2021</a:t>
             </a:fld>
             <a:endParaRPr lang="en-US"/>
           </a:p>
@@ -32041,7 +32041,7 @@
           <a:p>
             <a:fld id="{5958763E-B898-436D-883D-03711491D54A}" type="datetimeFigureOut">
               <a:rPr lang="en-US" smtClean="0"/>
-              <a:t>1/7/2021</a:t>
+              <a:t>1/28/2021</a:t>
             </a:fld>
             <a:endParaRPr lang="en-US"/>
           </a:p>
@@ -32376,7 +32376,7 @@
           <a:p>
             <a:fld id="{5958763E-B898-436D-883D-03711491D54A}" type="datetimeFigureOut">
               <a:rPr lang="en-US" smtClean="0"/>
-              <a:t>1/7/2021</a:t>
+              <a:t>1/28/2021</a:t>
             </a:fld>
             <a:endParaRPr lang="en-US"/>
           </a:p>
@@ -32606,7 +32606,7 @@
           <a:p>
             <a:fld id="{5958763E-B898-436D-883D-03711491D54A}" type="datetimeFigureOut">
               <a:rPr lang="en-US" smtClean="0"/>
-              <a:t>1/7/2021</a:t>
+              <a:t>1/28/2021</a:t>
             </a:fld>
             <a:endParaRPr lang="en-US"/>
           </a:p>
@@ -32850,7 +32850,7 @@
           <a:p>
             <a:fld id="{5958763E-B898-436D-883D-03711491D54A}" type="datetimeFigureOut">
               <a:rPr lang="en-US" smtClean="0"/>
-              <a:t>1/7/2021</a:t>
+              <a:t>1/28/2021</a:t>
             </a:fld>
             <a:endParaRPr lang="en-US"/>
           </a:p>

</xml_diff>